<commit_message>
Update presentation - minor correction
</commit_message>
<xml_diff>
--- a/docs/jDMN - DecisionCamp 2024.pptx
+++ b/docs/jDMN - DecisionCamp 2024.pptx
@@ -5,29 +5,28 @@
     <p:sldMasterId id="2147483660" r:id="rId4"/>
   </p:sldMasterIdLst>
   <p:notesMasterIdLst>
-    <p:notesMasterId r:id="rId22"/>
+    <p:notesMasterId r:id="rId21"/>
   </p:notesMasterIdLst>
   <p:handoutMasterIdLst>
-    <p:handoutMasterId r:id="rId23"/>
+    <p:handoutMasterId r:id="rId22"/>
   </p:handoutMasterIdLst>
   <p:sldIdLst>
     <p:sldId id="256" r:id="rId5"/>
     <p:sldId id="278" r:id="rId6"/>
     <p:sldId id="291" r:id="rId7"/>
-    <p:sldId id="283" r:id="rId8"/>
-    <p:sldId id="284" r:id="rId9"/>
-    <p:sldId id="268" r:id="rId10"/>
-    <p:sldId id="269" r:id="rId11"/>
-    <p:sldId id="280" r:id="rId12"/>
-    <p:sldId id="281" r:id="rId13"/>
-    <p:sldId id="276" r:id="rId14"/>
-    <p:sldId id="270" r:id="rId15"/>
-    <p:sldId id="287" r:id="rId16"/>
-    <p:sldId id="289" r:id="rId17"/>
-    <p:sldId id="290" r:id="rId18"/>
-    <p:sldId id="288" r:id="rId19"/>
-    <p:sldId id="286" r:id="rId20"/>
-    <p:sldId id="266" r:id="rId21"/>
+    <p:sldId id="284" r:id="rId8"/>
+    <p:sldId id="268" r:id="rId9"/>
+    <p:sldId id="269" r:id="rId10"/>
+    <p:sldId id="280" r:id="rId11"/>
+    <p:sldId id="281" r:id="rId12"/>
+    <p:sldId id="276" r:id="rId13"/>
+    <p:sldId id="270" r:id="rId14"/>
+    <p:sldId id="287" r:id="rId15"/>
+    <p:sldId id="289" r:id="rId16"/>
+    <p:sldId id="290" r:id="rId17"/>
+    <p:sldId id="288" r:id="rId18"/>
+    <p:sldId id="286" r:id="rId19"/>
+    <p:sldId id="266" r:id="rId20"/>
   </p:sldIdLst>
   <p:sldSz cx="9144000" cy="6858000" type="screen4x3"/>
   <p:notesSz cx="6810375" cy="9942513"/>
@@ -228,7 +227,7 @@
             <a:fld id="{D770D6DE-83B5-4E6D-9928-ED5430640FAB}" type="datetimeFigureOut">
               <a:rPr lang="en-US" smtClean="0"/>
               <a:pPr/>
-              <a:t>7/9/2024</a:t>
+              <a:t>9/20/2024</a:t>
             </a:fld>
             <a:endParaRPr lang="en-US"/>
           </a:p>
@@ -396,7 +395,7 @@
             <a:fld id="{29C20780-3741-46C7-B869-E290D70C69A5}" type="datetimeFigureOut">
               <a:rPr lang="en-US" smtClean="0"/>
               <a:pPr/>
-              <a:t>7/9/2024</a:t>
+              <a:t>9/20/2024</a:t>
             </a:fld>
             <a:endParaRPr lang="en-US"/>
           </a:p>
@@ -728,7 +727,7 @@
             <a:fld id="{D0574DD8-F12C-4B39-86DC-1908BDDB7681}" type="slidenum">
               <a:rPr lang="en-US" smtClean="0"/>
               <a:pPr/>
-              <a:t>6</a:t>
+              <a:t>5</a:t>
             </a:fld>
             <a:endParaRPr lang="en-US"/>
           </a:p>
@@ -4557,16 +4556,14 @@
         </p:nvSpPr>
         <p:spPr/>
         <p:txBody>
-          <a:bodyPr/>
+          <a:bodyPr>
+            <a:normAutofit/>
+          </a:bodyPr>
           <a:lstStyle/>
           <a:p>
             <a:r>
-              <a:rPr lang="en-GB" dirty="0" err="1"/>
-              <a:t>jDMN</a:t>
-            </a:r>
-            <a:r>
               <a:rPr lang="en-GB" dirty="0"/>
-              <a:t>: Translation</a:t>
+              <a:t>Code Optimisation – Model Level</a:t>
             </a:r>
           </a:p>
         </p:txBody>
@@ -4590,143 +4587,6 @@
               <a:rPr kumimoji="0" lang="en-US" smtClean="0"/>
               <a:pPr/>
               <a:t>10</a:t>
-            </a:fld>
-            <a:endParaRPr kumimoji="0" lang="en-US" dirty="0"/>
-          </a:p>
-        </p:txBody>
-      </p:sp>
-      <p:sp>
-        <p:nvSpPr>
-          <p:cNvPr id="5" name="Content Placeholder 4"/>
-          <p:cNvSpPr>
-            <a:spLocks noGrp="1"/>
-          </p:cNvSpPr>
-          <p:nvPr>
-            <p:ph sz="quarter" idx="1"/>
-          </p:nvPr>
-        </p:nvSpPr>
-        <p:spPr/>
-        <p:txBody>
-          <a:bodyPr>
-            <a:normAutofit/>
-          </a:bodyPr>
-          <a:lstStyle/>
-          <a:p>
-            <a:endParaRPr lang="en-GB" dirty="0"/>
-          </a:p>
-          <a:p>
-            <a:r>
-              <a:rPr lang="en-GB" dirty="0"/>
-              <a:t>Advantages include</a:t>
-            </a:r>
-          </a:p>
-          <a:p>
-            <a:pPr lvl="1"/>
-            <a:r>
-              <a:rPr lang="en-GB" i="1" dirty="0"/>
-              <a:t>Performance</a:t>
-            </a:r>
-            <a:r>
-              <a:rPr lang="en-GB" dirty="0"/>
-              <a:t>: we have seen runtimes 4-10 times faster than previous engine execution in complex decision tests</a:t>
-            </a:r>
-          </a:p>
-          <a:p>
-            <a:pPr lvl="1"/>
-            <a:r>
-              <a:rPr lang="en-GB" i="1" dirty="0"/>
-              <a:t>Stability:</a:t>
-            </a:r>
-            <a:r>
-              <a:rPr lang="en-GB" dirty="0"/>
-              <a:t> given that we now control the code generation, we are able to resolve issues without relying on the vendor</a:t>
-            </a:r>
-          </a:p>
-          <a:p>
-            <a:pPr lvl="1"/>
-            <a:r>
-              <a:rPr lang="en-GB" i="1" dirty="0"/>
-              <a:t>Functionality:</a:t>
-            </a:r>
-            <a:r>
-              <a:rPr lang="en-GB" dirty="0"/>
-              <a:t> the fact that we control the code generation means that we are also able to enable more advanced functionality for DMN/Java models</a:t>
-            </a:r>
-          </a:p>
-          <a:p>
-            <a:pPr lvl="1"/>
-            <a:endParaRPr lang="en-GB" dirty="0"/>
-          </a:p>
-        </p:txBody>
-      </p:sp>
-    </p:spTree>
-  </p:cSld>
-  <p:clrMapOvr>
-    <a:masterClrMapping/>
-  </p:clrMapOvr>
-</p:sld>
-</file>
-
-<file path=ppt/slides/slide11.xml><?xml version="1.0" encoding="utf-8"?>
-<p:sld xmlns:a="http://schemas.openxmlformats.org/drawingml/2006/main" xmlns:r="http://schemas.openxmlformats.org/officeDocument/2006/relationships" xmlns:p="http://schemas.openxmlformats.org/presentationml/2006/main">
-  <p:cSld>
-    <p:spTree>
-      <p:nvGrpSpPr>
-        <p:cNvPr id="1" name=""/>
-        <p:cNvGrpSpPr/>
-        <p:nvPr/>
-      </p:nvGrpSpPr>
-      <p:grpSpPr>
-        <a:xfrm>
-          <a:off x="0" y="0"/>
-          <a:ext cx="0" cy="0"/>
-          <a:chOff x="0" y="0"/>
-          <a:chExt cx="0" cy="0"/>
-        </a:xfrm>
-      </p:grpSpPr>
-      <p:sp>
-        <p:nvSpPr>
-          <p:cNvPr id="2" name="Title 1"/>
-          <p:cNvSpPr>
-            <a:spLocks noGrp="1"/>
-          </p:cNvSpPr>
-          <p:nvPr>
-            <p:ph type="title"/>
-          </p:nvPr>
-        </p:nvSpPr>
-        <p:spPr/>
-        <p:txBody>
-          <a:bodyPr>
-            <a:normAutofit/>
-          </a:bodyPr>
-          <a:lstStyle/>
-          <a:p>
-            <a:r>
-              <a:rPr lang="en-GB" dirty="0"/>
-              <a:t>Code Optimisation – Model Level</a:t>
-            </a:r>
-          </a:p>
-        </p:txBody>
-      </p:sp>
-      <p:sp>
-        <p:nvSpPr>
-          <p:cNvPr id="4" name="Slide Number Placeholder 3"/>
-          <p:cNvSpPr>
-            <a:spLocks noGrp="1"/>
-          </p:cNvSpPr>
-          <p:nvPr>
-            <p:ph type="sldNum" sz="quarter" idx="12"/>
-          </p:nvPr>
-        </p:nvSpPr>
-        <p:spPr/>
-        <p:txBody>
-          <a:bodyPr/>
-          <a:lstStyle/>
-          <a:p>
-            <a:fld id="{EA7C8D44-3667-46F6-9772-CC52308E2A7F}" type="slidenum">
-              <a:rPr kumimoji="0" lang="en-US" smtClean="0"/>
-              <a:pPr/>
-              <a:t>11</a:t>
             </a:fld>
             <a:endParaRPr kumimoji="0" lang="en-US" dirty="0"/>
           </a:p>
@@ -5804,7 +5664,7 @@
 </p:sld>
 </file>
 
-<file path=ppt/slides/slide12.xml><?xml version="1.0" encoding="utf-8"?>
+<file path=ppt/slides/slide11.xml><?xml version="1.0" encoding="utf-8"?>
 <p:sld xmlns:a="http://schemas.openxmlformats.org/drawingml/2006/main" xmlns:r="http://schemas.openxmlformats.org/officeDocument/2006/relationships" xmlns:p="http://schemas.openxmlformats.org/presentationml/2006/main">
   <p:cSld>
     <p:spTree>
@@ -5863,7 +5723,7 @@
             <a:fld id="{EA7C8D44-3667-46F6-9772-CC52308E2A7F}" type="slidenum">
               <a:rPr kumimoji="0" lang="en-US" smtClean="0"/>
               <a:pPr/>
-              <a:t>12</a:t>
+              <a:t>11</a:t>
             </a:fld>
             <a:endParaRPr kumimoji="0" lang="en-US" dirty="0"/>
           </a:p>
@@ -5994,7 +5854,7 @@
 </p:sld>
 </file>
 
-<file path=ppt/slides/slide13.xml><?xml version="1.0" encoding="utf-8"?>
+<file path=ppt/slides/slide12.xml><?xml version="1.0" encoding="utf-8"?>
 <p:sld xmlns:a="http://schemas.openxmlformats.org/drawingml/2006/main" xmlns:r="http://schemas.openxmlformats.org/officeDocument/2006/relationships" xmlns:p="http://schemas.openxmlformats.org/presentationml/2006/main">
   <p:cSld>
     <p:spTree>
@@ -6053,7 +5913,7 @@
             <a:fld id="{EA7C8D44-3667-46F6-9772-CC52308E2A7F}" type="slidenum">
               <a:rPr kumimoji="0" lang="en-US" smtClean="0"/>
               <a:pPr/>
-              <a:t>13</a:t>
+              <a:t>12</a:t>
             </a:fld>
             <a:endParaRPr kumimoji="0" lang="en-US" dirty="0"/>
           </a:p>
@@ -6166,7 +6026,7 @@
 </p:sld>
 </file>
 
-<file path=ppt/slides/slide14.xml><?xml version="1.0" encoding="utf-8"?>
+<file path=ppt/slides/slide13.xml><?xml version="1.0" encoding="utf-8"?>
 <p:sld xmlns:a="http://schemas.openxmlformats.org/drawingml/2006/main" xmlns:r="http://schemas.openxmlformats.org/officeDocument/2006/relationships" xmlns:p="http://schemas.openxmlformats.org/presentationml/2006/main">
   <p:cSld>
     <p:spTree>
@@ -6225,7 +6085,7 @@
             <a:fld id="{EA7C8D44-3667-46F6-9772-CC52308E2A7F}" type="slidenum">
               <a:rPr kumimoji="0" lang="en-US" smtClean="0"/>
               <a:pPr/>
-              <a:t>14</a:t>
+              <a:t>13</a:t>
             </a:fld>
             <a:endParaRPr kumimoji="0" lang="en-US" dirty="0"/>
           </a:p>
@@ -7990,6 +7850,120 @@
 </p:sld>
 </file>
 
+<file path=ppt/slides/slide14.xml><?xml version="1.0" encoding="utf-8"?>
+<p:sld xmlns:a="http://schemas.openxmlformats.org/drawingml/2006/main" xmlns:r="http://schemas.openxmlformats.org/officeDocument/2006/relationships" xmlns:p="http://schemas.openxmlformats.org/presentationml/2006/main">
+  <p:cSld>
+    <p:spTree>
+      <p:nvGrpSpPr>
+        <p:cNvPr id="1" name=""/>
+        <p:cNvGrpSpPr/>
+        <p:nvPr/>
+      </p:nvGrpSpPr>
+      <p:grpSpPr>
+        <a:xfrm>
+          <a:off x="0" y="0"/>
+          <a:ext cx="0" cy="0"/>
+          <a:chOff x="0" y="0"/>
+          <a:chExt cx="0" cy="0"/>
+        </a:xfrm>
+      </p:grpSpPr>
+      <p:sp>
+        <p:nvSpPr>
+          <p:cNvPr id="2" name="Title 1"/>
+          <p:cNvSpPr>
+            <a:spLocks noGrp="1"/>
+          </p:cNvSpPr>
+          <p:nvPr>
+            <p:ph type="title"/>
+          </p:nvPr>
+        </p:nvSpPr>
+        <p:spPr/>
+        <p:txBody>
+          <a:bodyPr>
+            <a:normAutofit/>
+          </a:bodyPr>
+          <a:lstStyle/>
+          <a:p>
+            <a:r>
+              <a:rPr lang="en-GB" dirty="0"/>
+              <a:t>Code Optimisation at FEEL level</a:t>
+            </a:r>
+          </a:p>
+        </p:txBody>
+      </p:sp>
+      <p:sp>
+        <p:nvSpPr>
+          <p:cNvPr id="4" name="Slide Number Placeholder 3"/>
+          <p:cNvSpPr>
+            <a:spLocks noGrp="1"/>
+          </p:cNvSpPr>
+          <p:nvPr>
+            <p:ph type="sldNum" sz="quarter" idx="12"/>
+          </p:nvPr>
+        </p:nvSpPr>
+        <p:spPr/>
+        <p:txBody>
+          <a:bodyPr/>
+          <a:lstStyle/>
+          <a:p>
+            <a:fld id="{EA7C8D44-3667-46F6-9772-CC52308E2A7F}" type="slidenum">
+              <a:rPr kumimoji="0" lang="en-US" smtClean="0"/>
+              <a:pPr/>
+              <a:t>14</a:t>
+            </a:fld>
+            <a:endParaRPr kumimoji="0" lang="en-US" dirty="0"/>
+          </a:p>
+        </p:txBody>
+      </p:sp>
+      <p:sp>
+        <p:nvSpPr>
+          <p:cNvPr id="5" name="Content Placeholder 4"/>
+          <p:cNvSpPr>
+            <a:spLocks noGrp="1"/>
+          </p:cNvSpPr>
+          <p:nvPr>
+            <p:ph sz="quarter" idx="1"/>
+          </p:nvPr>
+        </p:nvSpPr>
+        <p:spPr/>
+        <p:txBody>
+          <a:bodyPr>
+            <a:normAutofit/>
+          </a:bodyPr>
+          <a:lstStyle/>
+          <a:p>
+            <a:r>
+              <a:rPr lang="en-GB" dirty="0"/>
+              <a:t>Native Types</a:t>
+            </a:r>
+          </a:p>
+          <a:p>
+            <a:r>
+              <a:rPr lang="en-GB" dirty="0"/>
+              <a:t>Built-in functions</a:t>
+            </a:r>
+          </a:p>
+          <a:p>
+            <a:r>
+              <a:rPr lang="en-GB" dirty="0"/>
+              <a:t>Native Compiler / Interpreter (e.g. JIT compiler)</a:t>
+            </a:r>
+          </a:p>
+        </p:txBody>
+      </p:sp>
+    </p:spTree>
+    <p:extLst>
+      <p:ext uri="{BB962C8B-B14F-4D97-AF65-F5344CB8AC3E}">
+        <p14:creationId xmlns:p14="http://schemas.microsoft.com/office/powerpoint/2010/main" val="2773163056"/>
+      </p:ext>
+    </p:extLst>
+  </p:cSld>
+  <p:clrMapOvr>
+    <a:masterClrMapping/>
+  </p:clrMapOvr>
+</p:sld>
+</file>
+
 <file path=ppt/slides/slide15.xml><?xml version="1.0" encoding="utf-8"?>
 <p:sld xmlns:a="http://schemas.openxmlformats.org/drawingml/2006/main" xmlns:r="http://schemas.openxmlformats.org/officeDocument/2006/relationships" xmlns:p="http://schemas.openxmlformats.org/presentationml/2006/main">
   <p:cSld>
@@ -8026,7 +8000,7 @@
           <a:p>
             <a:r>
               <a:rPr lang="en-GB" dirty="0"/>
-              <a:t>Code Optimisation at FEEL level</a:t>
+              <a:t>What next?</a:t>
             </a:r>
           </a:p>
         </p:txBody>
@@ -8074,19 +8048,13 @@
           <a:p>
             <a:r>
               <a:rPr lang="en-GB" dirty="0"/>
-              <a:t>Native Types</a:t>
+              <a:t>Enhance lazy evaluation</a:t>
             </a:r>
           </a:p>
           <a:p>
             <a:r>
               <a:rPr lang="en-GB" dirty="0"/>
-              <a:t>Built-in functions</a:t>
-            </a:r>
-          </a:p>
-          <a:p>
-            <a:r>
-              <a:rPr lang="en-GB" dirty="0"/>
-              <a:t>Native Compiler / Interpreter (e.g. JIT compiler)</a:t>
+              <a:t>Three Address Code optimization</a:t>
             </a:r>
           </a:p>
         </p:txBody>
@@ -8094,7 +8062,7 @@
     </p:spTree>
     <p:extLst>
       <p:ext uri="{BB962C8B-B14F-4D97-AF65-F5344CB8AC3E}">
-        <p14:creationId xmlns:p14="http://schemas.microsoft.com/office/powerpoint/2010/main" val="2773163056"/>
+        <p14:creationId xmlns:p14="http://schemas.microsoft.com/office/powerpoint/2010/main" val="888131445"/>
       </p:ext>
     </p:extLst>
   </p:cSld>
@@ -8133,14 +8101,12 @@
         </p:nvSpPr>
         <p:spPr/>
         <p:txBody>
-          <a:bodyPr>
-            <a:normAutofit/>
-          </a:bodyPr>
+          <a:bodyPr/>
           <a:lstStyle/>
           <a:p>
             <a:r>
               <a:rPr lang="en-GB" dirty="0"/>
-              <a:t>What next?</a:t>
+              <a:t>Questions?</a:t>
             </a:r>
           </a:p>
         </p:txBody>
@@ -8164,112 +8130,6 @@
               <a:rPr kumimoji="0" lang="en-US" smtClean="0"/>
               <a:pPr/>
               <a:t>16</a:t>
-            </a:fld>
-            <a:endParaRPr kumimoji="0" lang="en-US" dirty="0"/>
-          </a:p>
-        </p:txBody>
-      </p:sp>
-      <p:sp>
-        <p:nvSpPr>
-          <p:cNvPr id="5" name="Content Placeholder 4"/>
-          <p:cNvSpPr>
-            <a:spLocks noGrp="1"/>
-          </p:cNvSpPr>
-          <p:nvPr>
-            <p:ph sz="quarter" idx="1"/>
-          </p:nvPr>
-        </p:nvSpPr>
-        <p:spPr/>
-        <p:txBody>
-          <a:bodyPr>
-            <a:normAutofit/>
-          </a:bodyPr>
-          <a:lstStyle/>
-          <a:p>
-            <a:r>
-              <a:rPr lang="en-GB" dirty="0"/>
-              <a:t>Enhance lazy evaluation</a:t>
-            </a:r>
-          </a:p>
-          <a:p>
-            <a:r>
-              <a:rPr lang="en-GB" dirty="0"/>
-              <a:t>Three Address Code optimization</a:t>
-            </a:r>
-          </a:p>
-        </p:txBody>
-      </p:sp>
-    </p:spTree>
-    <p:extLst>
-      <p:ext uri="{BB962C8B-B14F-4D97-AF65-F5344CB8AC3E}">
-        <p14:creationId xmlns:p14="http://schemas.microsoft.com/office/powerpoint/2010/main" val="888131445"/>
-      </p:ext>
-    </p:extLst>
-  </p:cSld>
-  <p:clrMapOvr>
-    <a:masterClrMapping/>
-  </p:clrMapOvr>
-</p:sld>
-</file>
-
-<file path=ppt/slides/slide17.xml><?xml version="1.0" encoding="utf-8"?>
-<p:sld xmlns:a="http://schemas.openxmlformats.org/drawingml/2006/main" xmlns:r="http://schemas.openxmlformats.org/officeDocument/2006/relationships" xmlns:p="http://schemas.openxmlformats.org/presentationml/2006/main">
-  <p:cSld>
-    <p:spTree>
-      <p:nvGrpSpPr>
-        <p:cNvPr id="1" name=""/>
-        <p:cNvGrpSpPr/>
-        <p:nvPr/>
-      </p:nvGrpSpPr>
-      <p:grpSpPr>
-        <a:xfrm>
-          <a:off x="0" y="0"/>
-          <a:ext cx="0" cy="0"/>
-          <a:chOff x="0" y="0"/>
-          <a:chExt cx="0" cy="0"/>
-        </a:xfrm>
-      </p:grpSpPr>
-      <p:sp>
-        <p:nvSpPr>
-          <p:cNvPr id="2" name="Title 1"/>
-          <p:cNvSpPr>
-            <a:spLocks noGrp="1"/>
-          </p:cNvSpPr>
-          <p:nvPr>
-            <p:ph type="title"/>
-          </p:nvPr>
-        </p:nvSpPr>
-        <p:spPr/>
-        <p:txBody>
-          <a:bodyPr/>
-          <a:lstStyle/>
-          <a:p>
-            <a:r>
-              <a:rPr lang="en-GB" dirty="0"/>
-              <a:t>Questions?</a:t>
-            </a:r>
-          </a:p>
-        </p:txBody>
-      </p:sp>
-      <p:sp>
-        <p:nvSpPr>
-          <p:cNvPr id="4" name="Slide Number Placeholder 3"/>
-          <p:cNvSpPr>
-            <a:spLocks noGrp="1"/>
-          </p:cNvSpPr>
-          <p:nvPr>
-            <p:ph type="sldNum" sz="quarter" idx="12"/>
-          </p:nvPr>
-        </p:nvSpPr>
-        <p:spPr/>
-        <p:txBody>
-          <a:bodyPr/>
-          <a:lstStyle/>
-          <a:p>
-            <a:fld id="{EA7C8D44-3667-46F6-9772-CC52308E2A7F}" type="slidenum">
-              <a:rPr kumimoji="0" lang="en-US" smtClean="0"/>
-              <a:pPr/>
-              <a:t>17</a:t>
             </a:fld>
             <a:endParaRPr kumimoji="0" lang="en-US" dirty="0"/>
           </a:p>
@@ -8532,35 +8392,6 @@
       </p:sp>
       <p:sp>
         <p:nvSpPr>
-          <p:cNvPr id="3" name="Date Placeholder 2">
-            <a:extLst>
-              <a:ext uri="{FF2B5EF4-FFF2-40B4-BE49-F238E27FC236}">
-                <a16:creationId xmlns:a16="http://schemas.microsoft.com/office/drawing/2014/main" id="{D45005DB-97C8-55C4-7F42-92E1E71EC0B6}"/>
-              </a:ext>
-            </a:extLst>
-          </p:cNvPr>
-          <p:cNvSpPr>
-            <a:spLocks noGrp="1"/>
-          </p:cNvSpPr>
-          <p:nvPr>
-            <p:ph type="dt" sz="half" idx="10"/>
-          </p:nvPr>
-        </p:nvSpPr>
-        <p:spPr/>
-        <p:txBody>
-          <a:bodyPr/>
-          <a:lstStyle/>
-          <a:p>
-            <a:r>
-              <a:rPr lang="en-US"/>
-              <a:t>5/12/2011</a:t>
-            </a:r>
-            <a:endParaRPr lang="en-US" dirty="0"/>
-          </a:p>
-        </p:txBody>
-      </p:sp>
-      <p:sp>
-        <p:nvSpPr>
           <p:cNvPr id="4" name="Slide Number Placeholder 3">
             <a:extLst>
               <a:ext uri="{FF2B5EF4-FFF2-40B4-BE49-F238E27FC236}">
@@ -8726,13 +8557,7 @@
       </p:grpSpPr>
       <p:sp>
         <p:nvSpPr>
-          <p:cNvPr id="2" name="Title 1">
-            <a:extLst>
-              <a:ext uri="{FF2B5EF4-FFF2-40B4-BE49-F238E27FC236}">
-                <a16:creationId xmlns:a16="http://schemas.microsoft.com/office/drawing/2014/main" id="{B3A10E57-4213-4BE4-9F5A-71BBF11C4DB8}"/>
-              </a:ext>
-            </a:extLst>
-          </p:cNvPr>
+          <p:cNvPr id="2" name="Title 1"/>
           <p:cNvSpPr>
             <a:spLocks noGrp="1"/>
           </p:cNvSpPr>
@@ -8746,21 +8571,19 @@
           <a:lstStyle/>
           <a:p>
             <a:r>
+              <a:rPr lang="en-GB" dirty="0" err="1"/>
+              <a:t>jDMN</a:t>
+            </a:r>
+            <a:r>
               <a:rPr lang="en-GB" dirty="0"/>
-              <a:t>What is DMN?</a:t>
-            </a:r>
-          </a:p>
-        </p:txBody>
-      </p:sp>
-      <p:sp>
-        <p:nvSpPr>
-          <p:cNvPr id="4" name="Slide Number Placeholder 3">
-            <a:extLst>
-              <a:ext uri="{FF2B5EF4-FFF2-40B4-BE49-F238E27FC236}">
-                <a16:creationId xmlns:a16="http://schemas.microsoft.com/office/drawing/2014/main" id="{F7BABE8C-F4CE-4057-9608-FD7C2F765074}"/>
-              </a:ext>
-            </a:extLst>
-          </p:cNvPr>
+              <a:t>: Overall Structure</a:t>
+            </a:r>
+          </a:p>
+        </p:txBody>
+      </p:sp>
+      <p:sp>
+        <p:nvSpPr>
+          <p:cNvPr id="4" name="Slide Number Placeholder 3"/>
           <p:cNvSpPr>
             <a:spLocks noGrp="1"/>
           </p:cNvSpPr>
@@ -8784,13 +8607,7 @@
       </p:sp>
       <p:sp>
         <p:nvSpPr>
-          <p:cNvPr id="5" name="Content Placeholder 4">
-            <a:extLst>
-              <a:ext uri="{FF2B5EF4-FFF2-40B4-BE49-F238E27FC236}">
-                <a16:creationId xmlns:a16="http://schemas.microsoft.com/office/drawing/2014/main" id="{9A749BB6-2C01-41FC-9088-BB5B464828CC}"/>
-              </a:ext>
-            </a:extLst>
-          </p:cNvPr>
+          <p:cNvPr id="5" name="Content Placeholder 4"/>
           <p:cNvSpPr>
             <a:spLocks noGrp="1"/>
           </p:cNvSpPr>
@@ -8800,231 +8617,84 @@
         </p:nvSpPr>
         <p:spPr>
           <a:xfrm>
-            <a:off x="457200" y="1219200"/>
-            <a:ext cx="4572000" cy="5257800"/>
+            <a:off x="457200" y="1234440"/>
+            <a:ext cx="8229600" cy="4937760"/>
           </a:xfrm>
         </p:spPr>
         <p:txBody>
-          <a:bodyPr>
-            <a:noAutofit/>
-          </a:bodyPr>
+          <a:bodyPr/>
           <a:lstStyle/>
           <a:p>
-            <a:pPr marL="0" indent="0">
-              <a:buNone/>
-            </a:pPr>
-            <a:r>
-              <a:rPr lang="en-GB" sz="1800" dirty="0"/>
-              <a:t>Decision Model and Notation (DMN)</a:t>
-            </a:r>
-          </a:p>
-          <a:p>
-            <a:pPr>
-              <a:spcBef>
-                <a:spcPts val="0"/>
-              </a:spcBef>
-              <a:buFont typeface="Gill Sans MT" panose="020B0502020104020203" pitchFamily="34" charset="0"/>
-              <a:buChar char="–"/>
-            </a:pPr>
-            <a:r>
-              <a:rPr lang="en-GB" sz="1800" dirty="0"/>
-              <a:t>Standard published by OMG</a:t>
-            </a:r>
-          </a:p>
-          <a:p>
-            <a:pPr>
-              <a:spcBef>
-                <a:spcPts val="0"/>
-              </a:spcBef>
-              <a:buFont typeface="Gill Sans MT" panose="020B0502020104020203" pitchFamily="34" charset="0"/>
-              <a:buChar char="–"/>
-            </a:pPr>
-            <a:r>
-              <a:rPr lang="en-GB" sz="1800" dirty="0"/>
-              <a:t>Notation to support decision management and business rules</a:t>
-            </a:r>
-          </a:p>
-          <a:p>
-            <a:pPr>
-              <a:spcBef>
-                <a:spcPts val="0"/>
-              </a:spcBef>
-              <a:buFont typeface="Gill Sans MT" panose="020B0502020104020203" pitchFamily="34" charset="0"/>
-              <a:buChar char="–"/>
-            </a:pPr>
-            <a:r>
-              <a:rPr lang="en-GB" sz="1800" dirty="0"/>
-              <a:t>Users</a:t>
-            </a:r>
-          </a:p>
-          <a:p>
-            <a:pPr lvl="1">
-              <a:spcBef>
-                <a:spcPts val="0"/>
-              </a:spcBef>
-              <a:buFont typeface="Gill Sans MT" panose="020B0502020104020203" pitchFamily="34" charset="0"/>
-              <a:buChar char="–"/>
-            </a:pPr>
-            <a:r>
-              <a:rPr lang="en-GB" sz="1800" dirty="0"/>
-              <a:t>Business People: manage and monitor decisions</a:t>
-            </a:r>
-          </a:p>
-          <a:p>
-            <a:pPr lvl="1">
-              <a:spcBef>
-                <a:spcPts val="0"/>
-              </a:spcBef>
-              <a:buFont typeface="Gill Sans MT" panose="020B0502020104020203" pitchFamily="34" charset="0"/>
-              <a:buChar char="–"/>
-            </a:pPr>
-            <a:r>
-              <a:rPr lang="en-GB" sz="1800" dirty="0"/>
-              <a:t>BAs or Functional Analysists: specify decision models</a:t>
-            </a:r>
-          </a:p>
-          <a:p>
-            <a:pPr lvl="1">
-              <a:spcBef>
-                <a:spcPts val="0"/>
-              </a:spcBef>
-              <a:buFont typeface="Gill Sans MT" panose="020B0502020104020203" pitchFamily="34" charset="0"/>
-              <a:buChar char="–"/>
-            </a:pPr>
-            <a:r>
-              <a:rPr lang="en-GB" sz="1800" dirty="0"/>
-              <a:t>Technical developers: execution and automation</a:t>
-            </a:r>
-          </a:p>
-          <a:p>
-            <a:pPr>
-              <a:spcBef>
-                <a:spcPts val="0"/>
-              </a:spcBef>
-              <a:buFont typeface="Gill Sans MT" panose="020B0502020104020203" pitchFamily="34" charset="0"/>
-              <a:buChar char="–"/>
-            </a:pPr>
-            <a:r>
-              <a:rPr lang="en-GB" sz="1800" dirty="0"/>
-              <a:t>DSL</a:t>
-            </a:r>
-          </a:p>
-          <a:p>
-            <a:pPr lvl="1">
-              <a:spcBef>
-                <a:spcPts val="0"/>
-              </a:spcBef>
-              <a:buFont typeface="Gill Sans MT" panose="020B0502020104020203" pitchFamily="34" charset="0"/>
-              <a:buChar char="–"/>
-            </a:pPr>
-            <a:r>
-              <a:rPr lang="en-GB" sz="1800" dirty="0"/>
-              <a:t>Diagrammatic notation</a:t>
-            </a:r>
-          </a:p>
-          <a:p>
-            <a:pPr lvl="1">
-              <a:spcBef>
-                <a:spcPts val="0"/>
-              </a:spcBef>
-              <a:buFont typeface="Gill Sans MT" panose="020B0502020104020203" pitchFamily="34" charset="0"/>
-              <a:buChar char="–"/>
-            </a:pPr>
-            <a:r>
-              <a:rPr lang="en-GB" sz="1800" dirty="0"/>
-              <a:t>Templates</a:t>
-            </a:r>
-          </a:p>
-          <a:p>
-            <a:pPr lvl="1">
-              <a:spcBef>
-                <a:spcPts val="0"/>
-              </a:spcBef>
-              <a:buFont typeface="Gill Sans MT" panose="020B0502020104020203" pitchFamily="34" charset="0"/>
-              <a:buChar char="–"/>
-            </a:pPr>
-            <a:r>
-              <a:rPr lang="en-GB" sz="1800" dirty="0"/>
-              <a:t>Expression language FEEL</a:t>
-            </a:r>
-          </a:p>
-          <a:p>
-            <a:pPr>
-              <a:spcBef>
-                <a:spcPts val="0"/>
-              </a:spcBef>
-              <a:buFont typeface="Gill Sans MT" panose="020B0502020104020203" pitchFamily="34" charset="0"/>
-              <a:buChar char="–"/>
-            </a:pPr>
-            <a:r>
-              <a:rPr lang="en-GB" sz="1800" dirty="0"/>
-              <a:t>Standalone or with BPMN &amp; CMMN</a:t>
-            </a:r>
-          </a:p>
-        </p:txBody>
-      </p:sp>
-      <p:pic>
-        <p:nvPicPr>
-          <p:cNvPr id="6" name="Picture 2">
-            <a:extLst>
-              <a:ext uri="{FF2B5EF4-FFF2-40B4-BE49-F238E27FC236}">
-                <a16:creationId xmlns:a16="http://schemas.microsoft.com/office/drawing/2014/main" id="{3822D1FE-3399-45C0-A4D1-CDC85F89BB89}"/>
-              </a:ext>
-            </a:extLst>
-          </p:cNvPr>
-          <p:cNvPicPr>
-            <a:picLocks noChangeAspect="1" noChangeArrowheads="1"/>
-          </p:cNvPicPr>
-          <p:nvPr/>
-        </p:nvPicPr>
-        <p:blipFill rotWithShape="1">
-          <a:blip r:embed="rId2">
-            <a:extLst>
-              <a:ext uri="{28A0092B-C50C-407E-A947-70E740481C1C}">
-                <a14:useLocalDpi xmlns:a14="http://schemas.microsoft.com/office/drawing/2010/main" val="0"/>
-              </a:ext>
-            </a:extLst>
-          </a:blip>
-          <a:srcRect l="33827" t="16466" r="20562" b="5352"/>
-          <a:stretch/>
-        </p:blipFill>
-        <p:spPr bwMode="auto">
-          <a:xfrm>
-            <a:off x="4961965" y="1171891"/>
-            <a:ext cx="3724835" cy="4917435"/>
-          </a:xfrm>
-          <a:prstGeom prst="rect">
-            <a:avLst/>
-          </a:prstGeom>
-          <a:noFill/>
-          <a:ln>
-            <a:noFill/>
-          </a:ln>
-          <a:extLst>
-            <a:ext uri="{909E8E84-426E-40DD-AFC4-6F175D3DCCD1}">
-              <a14:hiddenFill xmlns:a14="http://schemas.microsoft.com/office/drawing/2010/main">
-                <a:solidFill>
-                  <a:schemeClr val="accent1"/>
-                </a:solidFill>
-              </a14:hiddenFill>
-            </a:ext>
-            <a:ext uri="{91240B29-F687-4F45-9708-019B960494DF}">
-              <a14:hiddenLine xmlns:a14="http://schemas.microsoft.com/office/drawing/2010/main" w="9525">
-                <a:solidFill>
-                  <a:schemeClr val="tx1"/>
-                </a:solidFill>
-                <a:miter lim="800000"/>
-                <a:headEnd/>
-                <a:tailEnd/>
-              </a14:hiddenLine>
-            </a:ext>
-          </a:extLst>
-        </p:spPr>
-      </p:pic>
+            <a:r>
+              <a:rPr lang="en-GB" dirty="0"/>
+              <a:t>DMN Processors</a:t>
+            </a:r>
+          </a:p>
+          <a:p>
+            <a:pPr lvl="1"/>
+            <a:r>
+              <a:rPr lang="en-GB" dirty="0"/>
+              <a:t>Reader / Writer</a:t>
+            </a:r>
+          </a:p>
+          <a:p>
+            <a:pPr lvl="1"/>
+            <a:r>
+              <a:rPr lang="en-GB" dirty="0"/>
+              <a:t>Validators</a:t>
+            </a:r>
+          </a:p>
+          <a:p>
+            <a:pPr lvl="1"/>
+            <a:r>
+              <a:rPr lang="en-GB" dirty="0"/>
+              <a:t>Transformers</a:t>
+            </a:r>
+          </a:p>
+          <a:p>
+            <a:pPr lvl="1"/>
+            <a:r>
+              <a:rPr lang="en-GB" dirty="0"/>
+              <a:t>Interpreter</a:t>
+            </a:r>
+          </a:p>
+          <a:p>
+            <a:pPr lvl="1"/>
+            <a:r>
+              <a:rPr lang="en-GB" dirty="0"/>
+              <a:t>Translator</a:t>
+            </a:r>
+          </a:p>
+          <a:p>
+            <a:r>
+              <a:rPr lang="en-GB" dirty="0"/>
+              <a:t>Dialects</a:t>
+            </a:r>
+          </a:p>
+          <a:p>
+            <a:pPr lvl="1"/>
+            <a:r>
+              <a:rPr lang="en-GB" dirty="0"/>
+              <a:t>DMN 1.1 – 1.5</a:t>
+            </a:r>
+          </a:p>
+          <a:p>
+            <a:pPr lvl="1"/>
+            <a:r>
+              <a:rPr lang="en-GB" dirty="0" err="1"/>
+              <a:t>Signavio</a:t>
+            </a:r>
+            <a:endParaRPr lang="en-GB" dirty="0"/>
+          </a:p>
+          <a:p>
+            <a:endParaRPr lang="en-GB" dirty="0"/>
+          </a:p>
+        </p:txBody>
+      </p:sp>
     </p:spTree>
     <p:extLst>
       <p:ext uri="{BB962C8B-B14F-4D97-AF65-F5344CB8AC3E}">
-        <p14:creationId xmlns:p14="http://schemas.microsoft.com/office/powerpoint/2010/main" val="4195311060"/>
+        <p14:creationId xmlns:p14="http://schemas.microsoft.com/office/powerpoint/2010/main" val="2102199018"/>
       </p:ext>
     </p:extLst>
   </p:cSld>
@@ -9096,172 +8766,6 @@
               <a:rPr kumimoji="0" lang="en-US" smtClean="0"/>
               <a:pPr/>
               <a:t>5</a:t>
-            </a:fld>
-            <a:endParaRPr kumimoji="0" lang="en-US" dirty="0"/>
-          </a:p>
-        </p:txBody>
-      </p:sp>
-      <p:sp>
-        <p:nvSpPr>
-          <p:cNvPr id="5" name="Content Placeholder 4"/>
-          <p:cNvSpPr>
-            <a:spLocks noGrp="1"/>
-          </p:cNvSpPr>
-          <p:nvPr>
-            <p:ph sz="quarter" idx="1"/>
-          </p:nvPr>
-        </p:nvSpPr>
-        <p:spPr>
-          <a:xfrm>
-            <a:off x="457200" y="1234440"/>
-            <a:ext cx="8229600" cy="4937760"/>
-          </a:xfrm>
-        </p:spPr>
-        <p:txBody>
-          <a:bodyPr/>
-          <a:lstStyle/>
-          <a:p>
-            <a:r>
-              <a:rPr lang="en-GB" dirty="0"/>
-              <a:t>DMN Processors</a:t>
-            </a:r>
-          </a:p>
-          <a:p>
-            <a:pPr lvl="1"/>
-            <a:r>
-              <a:rPr lang="en-GB" dirty="0"/>
-              <a:t>Reader / Writer</a:t>
-            </a:r>
-          </a:p>
-          <a:p>
-            <a:pPr lvl="1"/>
-            <a:r>
-              <a:rPr lang="en-GB" dirty="0"/>
-              <a:t>Validators</a:t>
-            </a:r>
-          </a:p>
-          <a:p>
-            <a:pPr lvl="1"/>
-            <a:r>
-              <a:rPr lang="en-GB" dirty="0"/>
-              <a:t>Transformers</a:t>
-            </a:r>
-          </a:p>
-          <a:p>
-            <a:pPr lvl="1"/>
-            <a:r>
-              <a:rPr lang="en-GB" dirty="0"/>
-              <a:t>Interpreter</a:t>
-            </a:r>
-          </a:p>
-          <a:p>
-            <a:pPr lvl="1"/>
-            <a:r>
-              <a:rPr lang="en-GB" dirty="0"/>
-              <a:t>Translator</a:t>
-            </a:r>
-          </a:p>
-          <a:p>
-            <a:r>
-              <a:rPr lang="en-GB" dirty="0"/>
-              <a:t>Dialects</a:t>
-            </a:r>
-          </a:p>
-          <a:p>
-            <a:pPr lvl="1"/>
-            <a:r>
-              <a:rPr lang="en-GB" dirty="0"/>
-              <a:t>DMN 1.1 – 1.5</a:t>
-            </a:r>
-          </a:p>
-          <a:p>
-            <a:pPr lvl="1"/>
-            <a:r>
-              <a:rPr lang="en-GB" dirty="0" err="1"/>
-              <a:t>Signavio</a:t>
-            </a:r>
-            <a:endParaRPr lang="en-GB" dirty="0"/>
-          </a:p>
-          <a:p>
-            <a:endParaRPr lang="en-GB" dirty="0"/>
-          </a:p>
-        </p:txBody>
-      </p:sp>
-    </p:spTree>
-    <p:extLst>
-      <p:ext uri="{BB962C8B-B14F-4D97-AF65-F5344CB8AC3E}">
-        <p14:creationId xmlns:p14="http://schemas.microsoft.com/office/powerpoint/2010/main" val="2102199018"/>
-      </p:ext>
-    </p:extLst>
-  </p:cSld>
-  <p:clrMapOvr>
-    <a:masterClrMapping/>
-  </p:clrMapOvr>
-</p:sld>
-</file>
-
-<file path=ppt/slides/slide6.xml><?xml version="1.0" encoding="utf-8"?>
-<p:sld xmlns:a="http://schemas.openxmlformats.org/drawingml/2006/main" xmlns:r="http://schemas.openxmlformats.org/officeDocument/2006/relationships" xmlns:p="http://schemas.openxmlformats.org/presentationml/2006/main">
-  <p:cSld>
-    <p:spTree>
-      <p:nvGrpSpPr>
-        <p:cNvPr id="1" name=""/>
-        <p:cNvGrpSpPr/>
-        <p:nvPr/>
-      </p:nvGrpSpPr>
-      <p:grpSpPr>
-        <a:xfrm>
-          <a:off x="0" y="0"/>
-          <a:ext cx="0" cy="0"/>
-          <a:chOff x="0" y="0"/>
-          <a:chExt cx="0" cy="0"/>
-        </a:xfrm>
-      </p:grpSpPr>
-      <p:sp>
-        <p:nvSpPr>
-          <p:cNvPr id="2" name="Title 1"/>
-          <p:cNvSpPr>
-            <a:spLocks noGrp="1"/>
-          </p:cNvSpPr>
-          <p:nvPr>
-            <p:ph type="title"/>
-          </p:nvPr>
-        </p:nvSpPr>
-        <p:spPr/>
-        <p:txBody>
-          <a:bodyPr/>
-          <a:lstStyle/>
-          <a:p>
-            <a:r>
-              <a:rPr lang="en-GB" dirty="0" err="1"/>
-              <a:t>jDMN</a:t>
-            </a:r>
-            <a:r>
-              <a:rPr lang="en-GB" dirty="0"/>
-              <a:t>: Overall Structure</a:t>
-            </a:r>
-          </a:p>
-        </p:txBody>
-      </p:sp>
-      <p:sp>
-        <p:nvSpPr>
-          <p:cNvPr id="4" name="Slide Number Placeholder 3"/>
-          <p:cNvSpPr>
-            <a:spLocks noGrp="1"/>
-          </p:cNvSpPr>
-          <p:nvPr>
-            <p:ph type="sldNum" sz="quarter" idx="12"/>
-          </p:nvPr>
-        </p:nvSpPr>
-        <p:spPr/>
-        <p:txBody>
-          <a:bodyPr/>
-          <a:lstStyle/>
-          <a:p>
-            <a:fld id="{EA7C8D44-3667-46F6-9772-CC52308E2A7F}" type="slidenum">
-              <a:rPr kumimoji="0" lang="en-US" smtClean="0"/>
-              <a:pPr/>
-              <a:t>6</a:t>
             </a:fld>
             <a:endParaRPr kumimoji="0" lang="en-US" dirty="0"/>
           </a:p>
@@ -10518,7 +10022,7 @@
 </p:sld>
 </file>
 
-<file path=ppt/slides/slide7.xml><?xml version="1.0" encoding="utf-8"?>
+<file path=ppt/slides/slide6.xml><?xml version="1.0" encoding="utf-8"?>
 <p:sld xmlns:a="http://schemas.openxmlformats.org/drawingml/2006/main" xmlns:r="http://schemas.openxmlformats.org/officeDocument/2006/relationships" xmlns:p="http://schemas.openxmlformats.org/presentationml/2006/main">
   <p:cSld>
     <p:spTree>
@@ -10575,7 +10079,7 @@
             <a:fld id="{EA7C8D44-3667-46F6-9772-CC52308E2A7F}" type="slidenum">
               <a:rPr kumimoji="0" lang="en-US" smtClean="0"/>
               <a:pPr/>
-              <a:t>7</a:t>
+              <a:t>6</a:t>
             </a:fld>
             <a:endParaRPr kumimoji="0" lang="en-US" dirty="0"/>
           </a:p>
@@ -10745,7 +10249,7 @@
 </p:sld>
 </file>
 
-<file path=ppt/slides/slide8.xml><?xml version="1.0" encoding="utf-8"?>
+<file path=ppt/slides/slide7.xml><?xml version="1.0" encoding="utf-8"?>
 <p:sld xmlns:a="http://schemas.openxmlformats.org/drawingml/2006/main" xmlns:r="http://schemas.openxmlformats.org/officeDocument/2006/relationships" xmlns:p="http://schemas.openxmlformats.org/presentationml/2006/main">
   <p:cSld>
     <p:spTree>
@@ -10790,29 +10294,6 @@
       </p:sp>
       <p:sp>
         <p:nvSpPr>
-          <p:cNvPr id="3" name="Date Placeholder 2"/>
-          <p:cNvSpPr>
-            <a:spLocks noGrp="1"/>
-          </p:cNvSpPr>
-          <p:nvPr>
-            <p:ph type="dt" sz="half" idx="10"/>
-          </p:nvPr>
-        </p:nvSpPr>
-        <p:spPr/>
-        <p:txBody>
-          <a:bodyPr/>
-          <a:lstStyle/>
-          <a:p>
-            <a:r>
-              <a:rPr lang="en-US"/>
-              <a:t>5/12/2011</a:t>
-            </a:r>
-            <a:endParaRPr lang="en-US" dirty="0"/>
-          </a:p>
-        </p:txBody>
-      </p:sp>
-      <p:sp>
-        <p:nvSpPr>
           <p:cNvPr id="4" name="Slide Number Placeholder 3"/>
           <p:cNvSpPr>
             <a:spLocks noGrp="1"/>
@@ -10829,7 +10310,7 @@
             <a:fld id="{EA7C8D44-3667-46F6-9772-CC52308E2A7F}" type="slidenum">
               <a:rPr kumimoji="0" lang="en-US" smtClean="0"/>
               <a:pPr/>
-              <a:t>8</a:t>
+              <a:t>7</a:t>
             </a:fld>
             <a:endParaRPr kumimoji="0" lang="en-US" dirty="0"/>
           </a:p>
@@ -11004,6 +10485,643 @@
 </p:sld>
 </file>
 
+<file path=ppt/slides/slide8.xml><?xml version="1.0" encoding="utf-8"?>
+<p:sld xmlns:a="http://schemas.openxmlformats.org/drawingml/2006/main" xmlns:r="http://schemas.openxmlformats.org/officeDocument/2006/relationships" xmlns:p="http://schemas.openxmlformats.org/presentationml/2006/main">
+  <p:cSld>
+    <p:spTree>
+      <p:nvGrpSpPr>
+        <p:cNvPr id="1" name=""/>
+        <p:cNvGrpSpPr/>
+        <p:nvPr/>
+      </p:nvGrpSpPr>
+      <p:grpSpPr>
+        <a:xfrm>
+          <a:off x="0" y="0"/>
+          <a:ext cx="0" cy="0"/>
+          <a:chOff x="0" y="0"/>
+          <a:chExt cx="0" cy="0"/>
+        </a:xfrm>
+      </p:grpSpPr>
+      <p:sp>
+        <p:nvSpPr>
+          <p:cNvPr id="2" name="Title 1"/>
+          <p:cNvSpPr>
+            <a:spLocks noGrp="1"/>
+          </p:cNvSpPr>
+          <p:nvPr>
+            <p:ph type="title"/>
+          </p:nvPr>
+        </p:nvSpPr>
+        <p:spPr/>
+        <p:txBody>
+          <a:bodyPr/>
+          <a:lstStyle/>
+          <a:p>
+            <a:r>
+              <a:rPr lang="en-GB" dirty="0" err="1"/>
+              <a:t>jDMN</a:t>
+            </a:r>
+            <a:r>
+              <a:rPr lang="en-GB" dirty="0"/>
+              <a:t>: Translation</a:t>
+            </a:r>
+          </a:p>
+        </p:txBody>
+      </p:sp>
+      <p:sp>
+        <p:nvSpPr>
+          <p:cNvPr id="4" name="Slide Number Placeholder 3"/>
+          <p:cNvSpPr>
+            <a:spLocks noGrp="1"/>
+          </p:cNvSpPr>
+          <p:nvPr>
+            <p:ph type="sldNum" sz="quarter" idx="12"/>
+          </p:nvPr>
+        </p:nvSpPr>
+        <p:spPr/>
+        <p:txBody>
+          <a:bodyPr/>
+          <a:lstStyle/>
+          <a:p>
+            <a:fld id="{EA7C8D44-3667-46F6-9772-CC52308E2A7F}" type="slidenum">
+              <a:rPr kumimoji="0" lang="en-US" smtClean="0"/>
+              <a:pPr/>
+              <a:t>8</a:t>
+            </a:fld>
+            <a:endParaRPr kumimoji="0" lang="en-US" dirty="0"/>
+          </a:p>
+        </p:txBody>
+      </p:sp>
+      <p:sp>
+        <p:nvSpPr>
+          <p:cNvPr id="5" name="Content Placeholder 4"/>
+          <p:cNvSpPr>
+            <a:spLocks noGrp="1"/>
+          </p:cNvSpPr>
+          <p:nvPr>
+            <p:ph sz="quarter" idx="1"/>
+          </p:nvPr>
+        </p:nvSpPr>
+        <p:spPr/>
+        <p:txBody>
+          <a:bodyPr/>
+          <a:lstStyle/>
+          <a:p>
+            <a:r>
+              <a:rPr lang="en-GB" dirty="0"/>
+              <a:t>How did we built it?</a:t>
+            </a:r>
+          </a:p>
+          <a:p>
+            <a:pPr lvl="1"/>
+            <a:r>
+              <a:rPr lang="en-GB" dirty="0"/>
+              <a:t>Syntax-Driven Translation </a:t>
+            </a:r>
+            <a:r>
+              <a:rPr lang="en-GB" dirty="0" err="1"/>
+              <a:t>Schematas</a:t>
+            </a:r>
+            <a:r>
+              <a:rPr lang="en-GB" dirty="0"/>
+              <a:t> (SDTS)</a:t>
+            </a:r>
+          </a:p>
+          <a:p>
+            <a:pPr lvl="1"/>
+            <a:r>
+              <a:rPr lang="en-GB" dirty="0"/>
+              <a:t>Based on Knuth’s attributed grammars</a:t>
+            </a:r>
+          </a:p>
+          <a:p>
+            <a:pPr lvl="2"/>
+            <a:r>
+              <a:rPr lang="en-GB" dirty="0"/>
+              <a:t>Synthesized attributes</a:t>
+            </a:r>
+          </a:p>
+          <a:p>
+            <a:pPr lvl="2"/>
+            <a:r>
+              <a:rPr lang="en-GB" dirty="0"/>
+              <a:t>Inherited Attributes</a:t>
+            </a:r>
+          </a:p>
+          <a:p>
+            <a:pPr marL="594360" lvl="2" indent="0">
+              <a:buNone/>
+            </a:pPr>
+            <a:endParaRPr lang="en-GB" dirty="0"/>
+          </a:p>
+          <a:p>
+            <a:pPr marL="594360" lvl="2" indent="0">
+              <a:buNone/>
+            </a:pPr>
+            <a:endParaRPr lang="en-GB" dirty="0"/>
+          </a:p>
+          <a:p>
+            <a:pPr marL="0" indent="0">
+              <a:buNone/>
+            </a:pPr>
+            <a:r>
+              <a:rPr lang="en-GB" sz="1600" b="1" dirty="0">
+                <a:latin typeface="Courier" pitchFamily="49" charset="0"/>
+              </a:rPr>
+              <a:t>Expr</a:t>
+            </a:r>
+            <a:r>
+              <a:rPr lang="en-GB" sz="1600" b="1" baseline="-25000" dirty="0">
+                <a:latin typeface="Courier" pitchFamily="49" charset="0"/>
+              </a:rPr>
+              <a:t>1</a:t>
+            </a:r>
+            <a:r>
+              <a:rPr lang="en-GB" sz="1600" dirty="0">
+                <a:latin typeface="Courier" pitchFamily="49" charset="0"/>
+              </a:rPr>
+              <a:t> → </a:t>
+            </a:r>
+            <a:r>
+              <a:rPr lang="en-GB" sz="1600" b="1" dirty="0">
+                <a:latin typeface="Courier" pitchFamily="49" charset="0"/>
+              </a:rPr>
+              <a:t>Expr</a:t>
+            </a:r>
+            <a:r>
+              <a:rPr lang="en-GB" sz="1600" b="1" baseline="-25000" dirty="0">
+                <a:latin typeface="Courier" pitchFamily="49" charset="0"/>
+              </a:rPr>
+              <a:t>2</a:t>
+            </a:r>
+            <a:r>
+              <a:rPr lang="en-GB" sz="1600" dirty="0">
+                <a:latin typeface="Courier" pitchFamily="49" charset="0"/>
+              </a:rPr>
+              <a:t> + </a:t>
+            </a:r>
+            <a:r>
+              <a:rPr lang="en-GB" sz="1600" b="1" dirty="0">
+                <a:latin typeface="Courier" pitchFamily="49" charset="0"/>
+              </a:rPr>
+              <a:t>Term	</a:t>
+            </a:r>
+            <a:r>
+              <a:rPr lang="en-GB" sz="1600" dirty="0">
+                <a:latin typeface="Courier" pitchFamily="49" charset="0"/>
+              </a:rPr>
+              <a:t>{ </a:t>
+            </a:r>
+            <a:r>
+              <a:rPr lang="en-GB" sz="1600" b="1" dirty="0">
+                <a:latin typeface="Courier" pitchFamily="49" charset="0"/>
+              </a:rPr>
+              <a:t>Expr</a:t>
+            </a:r>
+            <a:r>
+              <a:rPr lang="en-GB" sz="1600" b="1" baseline="-25000" dirty="0">
+                <a:latin typeface="Courier" pitchFamily="49" charset="0"/>
+              </a:rPr>
+              <a:t>1</a:t>
+            </a:r>
+            <a:r>
+              <a:rPr lang="en-GB" sz="1600" dirty="0">
+                <a:latin typeface="Courier" pitchFamily="49" charset="0"/>
+              </a:rPr>
+              <a:t>.value = </a:t>
+            </a:r>
+            <a:r>
+              <a:rPr lang="en-GB" sz="1600" b="1" dirty="0">
+                <a:latin typeface="Courier" pitchFamily="49" charset="0"/>
+              </a:rPr>
+              <a:t>Expr</a:t>
+            </a:r>
+            <a:r>
+              <a:rPr lang="en-GB" sz="1600" b="1" baseline="-25000" dirty="0">
+                <a:latin typeface="Courier" pitchFamily="49" charset="0"/>
+              </a:rPr>
+              <a:t>2</a:t>
+            </a:r>
+            <a:r>
+              <a:rPr lang="en-GB" sz="1600" dirty="0">
+                <a:latin typeface="Courier" pitchFamily="49" charset="0"/>
+              </a:rPr>
+              <a:t>.value + </a:t>
+            </a:r>
+            <a:r>
+              <a:rPr lang="en-GB" sz="1600" b="1" dirty="0" err="1">
+                <a:latin typeface="Courier" pitchFamily="49" charset="0"/>
+              </a:rPr>
+              <a:t>Term</a:t>
+            </a:r>
+            <a:r>
+              <a:rPr lang="en-GB" sz="1600" dirty="0" err="1">
+                <a:latin typeface="Courier" pitchFamily="49" charset="0"/>
+              </a:rPr>
+              <a:t>.value</a:t>
+            </a:r>
+            <a:r>
+              <a:rPr lang="en-GB" sz="1600" dirty="0">
+                <a:latin typeface="Courier" pitchFamily="49" charset="0"/>
+              </a:rPr>
+              <a:t> }</a:t>
+            </a:r>
+          </a:p>
+          <a:p>
+            <a:pPr marL="0" indent="0">
+              <a:buNone/>
+            </a:pPr>
+            <a:r>
+              <a:rPr lang="en-GB" sz="1600" b="1" dirty="0">
+                <a:latin typeface="Courier" pitchFamily="49" charset="0"/>
+              </a:rPr>
+              <a:t>Expr</a:t>
+            </a:r>
+            <a:r>
+              <a:rPr lang="en-GB" sz="1600" dirty="0">
+                <a:latin typeface="Courier" pitchFamily="49" charset="0"/>
+              </a:rPr>
+              <a:t> → </a:t>
+            </a:r>
+            <a:r>
+              <a:rPr lang="en-GB" sz="1600" b="1" dirty="0">
+                <a:latin typeface="Courier" pitchFamily="49" charset="0"/>
+              </a:rPr>
+              <a:t>Term</a:t>
+            </a:r>
+            <a:r>
+              <a:rPr lang="en-GB" sz="1600" dirty="0">
+                <a:latin typeface="Courier" pitchFamily="49" charset="0"/>
+              </a:rPr>
+              <a:t>		{ </a:t>
+            </a:r>
+            <a:r>
+              <a:rPr lang="en-GB" sz="1600" b="1" dirty="0" err="1">
+                <a:latin typeface="Courier" pitchFamily="49" charset="0"/>
+              </a:rPr>
+              <a:t>Expr</a:t>
+            </a:r>
+            <a:r>
+              <a:rPr lang="en-GB" sz="1600" dirty="0" err="1">
+                <a:latin typeface="Courier" pitchFamily="49" charset="0"/>
+              </a:rPr>
+              <a:t>.value</a:t>
+            </a:r>
+            <a:r>
+              <a:rPr lang="en-GB" sz="1600" dirty="0">
+                <a:latin typeface="Courier" pitchFamily="49" charset="0"/>
+              </a:rPr>
+              <a:t> = </a:t>
+            </a:r>
+            <a:r>
+              <a:rPr lang="en-GB" sz="1600" b="1" dirty="0" err="1">
+                <a:latin typeface="Courier" pitchFamily="49" charset="0"/>
+              </a:rPr>
+              <a:t>Term</a:t>
+            </a:r>
+            <a:r>
+              <a:rPr lang="en-GB" sz="1600" dirty="0" err="1">
+                <a:latin typeface="Courier" pitchFamily="49" charset="0"/>
+              </a:rPr>
+              <a:t>.value</a:t>
+            </a:r>
+            <a:r>
+              <a:rPr lang="en-GB" sz="1600" dirty="0">
+                <a:latin typeface="Courier" pitchFamily="49" charset="0"/>
+              </a:rPr>
+              <a:t> }</a:t>
+            </a:r>
+          </a:p>
+          <a:p>
+            <a:pPr marL="0" indent="0">
+              <a:buNone/>
+            </a:pPr>
+            <a:r>
+              <a:rPr lang="en-GB" sz="1600" b="1" dirty="0">
+                <a:latin typeface="Courier" pitchFamily="49" charset="0"/>
+              </a:rPr>
+              <a:t>Term</a:t>
+            </a:r>
+            <a:r>
+              <a:rPr lang="en-GB" sz="1600" b="1" baseline="-25000" dirty="0">
+                <a:latin typeface="Courier" pitchFamily="49" charset="0"/>
+              </a:rPr>
+              <a:t>1</a:t>
+            </a:r>
+            <a:r>
+              <a:rPr lang="en-GB" sz="1600" dirty="0">
+                <a:latin typeface="Courier" pitchFamily="49" charset="0"/>
+              </a:rPr>
+              <a:t> → </a:t>
+            </a:r>
+            <a:r>
+              <a:rPr lang="en-GB" sz="1600" b="1" dirty="0">
+                <a:latin typeface="Courier" pitchFamily="49" charset="0"/>
+              </a:rPr>
+              <a:t>Term</a:t>
+            </a:r>
+            <a:r>
+              <a:rPr lang="en-GB" sz="1600" b="1" baseline="-25000" dirty="0">
+                <a:latin typeface="Courier" pitchFamily="49" charset="0"/>
+              </a:rPr>
+              <a:t>2</a:t>
+            </a:r>
+            <a:r>
+              <a:rPr lang="en-GB" sz="1600" dirty="0">
+                <a:latin typeface="Courier" pitchFamily="49" charset="0"/>
+              </a:rPr>
+              <a:t> * </a:t>
+            </a:r>
+            <a:r>
+              <a:rPr lang="en-GB" sz="1600" b="1" dirty="0">
+                <a:latin typeface="Courier" pitchFamily="49" charset="0"/>
+              </a:rPr>
+              <a:t>Factor	</a:t>
+            </a:r>
+            <a:r>
+              <a:rPr lang="en-GB" sz="1600" dirty="0">
+                <a:latin typeface="Courier" pitchFamily="49" charset="0"/>
+              </a:rPr>
+              <a:t>{ </a:t>
+            </a:r>
+            <a:r>
+              <a:rPr lang="en-GB" sz="1600" b="1" dirty="0">
+                <a:latin typeface="Courier" pitchFamily="49" charset="0"/>
+              </a:rPr>
+              <a:t>Term</a:t>
+            </a:r>
+            <a:r>
+              <a:rPr lang="en-GB" sz="1600" b="1" baseline="-25000" dirty="0">
+                <a:latin typeface="Courier" pitchFamily="49" charset="0"/>
+              </a:rPr>
+              <a:t>1</a:t>
+            </a:r>
+            <a:r>
+              <a:rPr lang="en-GB" sz="1600" dirty="0">
+                <a:latin typeface="Courier" pitchFamily="49" charset="0"/>
+              </a:rPr>
+              <a:t>.value = </a:t>
+            </a:r>
+            <a:r>
+              <a:rPr lang="en-GB" sz="1600" b="1" dirty="0">
+                <a:latin typeface="Courier" pitchFamily="49" charset="0"/>
+              </a:rPr>
+              <a:t>Term</a:t>
+            </a:r>
+            <a:r>
+              <a:rPr lang="en-GB" sz="1600" b="1" baseline="-25000" dirty="0">
+                <a:latin typeface="Courier" pitchFamily="49" charset="0"/>
+              </a:rPr>
+              <a:t>2</a:t>
+            </a:r>
+            <a:r>
+              <a:rPr lang="en-GB" sz="1600" dirty="0">
+                <a:latin typeface="Courier" pitchFamily="49" charset="0"/>
+              </a:rPr>
+              <a:t>.value * </a:t>
+            </a:r>
+            <a:r>
+              <a:rPr lang="en-GB" sz="1600" b="1" dirty="0" err="1">
+                <a:latin typeface="Courier" pitchFamily="49" charset="0"/>
+              </a:rPr>
+              <a:t>Factor</a:t>
+            </a:r>
+            <a:r>
+              <a:rPr lang="en-GB" sz="1600" dirty="0" err="1">
+                <a:latin typeface="Courier" pitchFamily="49" charset="0"/>
+              </a:rPr>
+              <a:t>.value</a:t>
+            </a:r>
+            <a:r>
+              <a:rPr lang="en-GB" sz="1600" dirty="0">
+                <a:latin typeface="Courier" pitchFamily="49" charset="0"/>
+              </a:rPr>
+              <a:t> }</a:t>
+            </a:r>
+          </a:p>
+          <a:p>
+            <a:pPr marL="0" indent="0">
+              <a:buNone/>
+            </a:pPr>
+            <a:r>
+              <a:rPr lang="en-GB" sz="1600" b="1" dirty="0">
+                <a:latin typeface="Courier" pitchFamily="49" charset="0"/>
+              </a:rPr>
+              <a:t>Term</a:t>
+            </a:r>
+            <a:r>
+              <a:rPr lang="en-GB" sz="1600" dirty="0">
+                <a:latin typeface="Courier" pitchFamily="49" charset="0"/>
+              </a:rPr>
+              <a:t> → </a:t>
+            </a:r>
+            <a:r>
+              <a:rPr lang="en-GB" sz="1600" b="1" dirty="0">
+                <a:latin typeface="Courier" pitchFamily="49" charset="0"/>
+              </a:rPr>
+              <a:t>Factor</a:t>
+            </a:r>
+            <a:r>
+              <a:rPr lang="en-GB" sz="1600" dirty="0">
+                <a:latin typeface="Courier" pitchFamily="49" charset="0"/>
+              </a:rPr>
+              <a:t>		{ </a:t>
+            </a:r>
+            <a:r>
+              <a:rPr lang="en-GB" sz="1600" b="1" dirty="0" err="1">
+                <a:latin typeface="Courier" pitchFamily="49" charset="0"/>
+              </a:rPr>
+              <a:t>Term</a:t>
+            </a:r>
+            <a:r>
+              <a:rPr lang="en-GB" sz="1600" dirty="0" err="1">
+                <a:latin typeface="Courier" pitchFamily="49" charset="0"/>
+              </a:rPr>
+              <a:t>.value</a:t>
+            </a:r>
+            <a:r>
+              <a:rPr lang="en-GB" sz="1600" dirty="0">
+                <a:latin typeface="Courier" pitchFamily="49" charset="0"/>
+              </a:rPr>
+              <a:t> = </a:t>
+            </a:r>
+            <a:r>
+              <a:rPr lang="en-GB" sz="1600" b="1" dirty="0" err="1">
+                <a:latin typeface="Courier" pitchFamily="49" charset="0"/>
+              </a:rPr>
+              <a:t>Factor</a:t>
+            </a:r>
+            <a:r>
+              <a:rPr lang="en-GB" sz="1600" dirty="0" err="1">
+                <a:latin typeface="Courier" pitchFamily="49" charset="0"/>
+              </a:rPr>
+              <a:t>.value</a:t>
+            </a:r>
+            <a:r>
+              <a:rPr lang="en-GB" sz="1600" dirty="0">
+                <a:latin typeface="Courier" pitchFamily="49" charset="0"/>
+              </a:rPr>
+              <a:t> } </a:t>
+            </a:r>
+          </a:p>
+          <a:p>
+            <a:pPr marL="0" indent="0">
+              <a:buNone/>
+            </a:pPr>
+            <a:r>
+              <a:rPr lang="en-GB" sz="1600" b="1" dirty="0">
+                <a:latin typeface="Courier" pitchFamily="49" charset="0"/>
+              </a:rPr>
+              <a:t>Factor</a:t>
+            </a:r>
+            <a:r>
+              <a:rPr lang="en-GB" sz="1600" dirty="0">
+                <a:latin typeface="Courier" pitchFamily="49" charset="0"/>
+              </a:rPr>
+              <a:t> → "(" </a:t>
+            </a:r>
+            <a:r>
+              <a:rPr lang="en-GB" sz="1600" b="1" dirty="0">
+                <a:latin typeface="Courier" pitchFamily="49" charset="0"/>
+              </a:rPr>
+              <a:t>Expr</a:t>
+            </a:r>
+            <a:r>
+              <a:rPr lang="en-GB" sz="1600" dirty="0">
+                <a:latin typeface="Courier" pitchFamily="49" charset="0"/>
+              </a:rPr>
+              <a:t> ")	{ </a:t>
+            </a:r>
+            <a:r>
+              <a:rPr lang="en-GB" sz="1600" b="1" dirty="0" err="1">
+                <a:latin typeface="Courier" pitchFamily="49" charset="0"/>
+              </a:rPr>
+              <a:t>Factor</a:t>
+            </a:r>
+            <a:r>
+              <a:rPr lang="en-GB" sz="1600" dirty="0" err="1">
+                <a:latin typeface="Courier" pitchFamily="49" charset="0"/>
+              </a:rPr>
+              <a:t>.value</a:t>
+            </a:r>
+            <a:r>
+              <a:rPr lang="en-GB" sz="1600" dirty="0">
+                <a:latin typeface="Courier" pitchFamily="49" charset="0"/>
+              </a:rPr>
+              <a:t> = </a:t>
+            </a:r>
+            <a:r>
+              <a:rPr lang="en-GB" sz="1600" b="1" dirty="0" err="1">
+                <a:latin typeface="Courier" pitchFamily="49" charset="0"/>
+              </a:rPr>
+              <a:t>Expr</a:t>
+            </a:r>
+            <a:r>
+              <a:rPr lang="en-GB" sz="1600" dirty="0" err="1">
+                <a:latin typeface="Courier" pitchFamily="49" charset="0"/>
+              </a:rPr>
+              <a:t>.value</a:t>
+            </a:r>
+            <a:r>
+              <a:rPr lang="en-GB" sz="1600" dirty="0">
+                <a:latin typeface="Courier" pitchFamily="49" charset="0"/>
+              </a:rPr>
+              <a:t> } </a:t>
+            </a:r>
+          </a:p>
+          <a:p>
+            <a:pPr marL="0" indent="0">
+              <a:buNone/>
+            </a:pPr>
+            <a:r>
+              <a:rPr lang="en-GB" sz="1600" b="1" dirty="0">
+                <a:latin typeface="Courier" pitchFamily="49" charset="0"/>
+              </a:rPr>
+              <a:t>Factor</a:t>
+            </a:r>
+            <a:r>
+              <a:rPr lang="en-GB" sz="1600" dirty="0">
+                <a:latin typeface="Courier" pitchFamily="49" charset="0"/>
+              </a:rPr>
+              <a:t> → </a:t>
+            </a:r>
+            <a:r>
+              <a:rPr lang="en-GB" sz="1600" i="1" dirty="0">
+                <a:latin typeface="Courier" pitchFamily="49" charset="0"/>
+              </a:rPr>
+              <a:t>integer</a:t>
+            </a:r>
+            <a:r>
+              <a:rPr lang="en-GB" sz="1600" dirty="0">
+                <a:latin typeface="Courier" pitchFamily="49" charset="0"/>
+              </a:rPr>
+              <a:t> 	{ </a:t>
+            </a:r>
+            <a:r>
+              <a:rPr lang="en-GB" sz="1600" b="1" dirty="0" err="1">
+                <a:latin typeface="Courier" pitchFamily="49" charset="0"/>
+              </a:rPr>
+              <a:t>Factor</a:t>
+            </a:r>
+            <a:r>
+              <a:rPr lang="en-GB" sz="1600" dirty="0" err="1">
+                <a:latin typeface="Courier" pitchFamily="49" charset="0"/>
+              </a:rPr>
+              <a:t>.value</a:t>
+            </a:r>
+            <a:r>
+              <a:rPr lang="en-GB" sz="1600" dirty="0">
+                <a:latin typeface="Courier" pitchFamily="49" charset="0"/>
+              </a:rPr>
+              <a:t> = </a:t>
+            </a:r>
+            <a:r>
+              <a:rPr lang="en-GB" sz="1600" dirty="0" err="1">
+                <a:latin typeface="Courier" pitchFamily="49" charset="0"/>
+              </a:rPr>
+              <a:t>strToInt</a:t>
+            </a:r>
+            <a:r>
+              <a:rPr lang="en-GB" sz="1600" dirty="0">
+                <a:latin typeface="Courier" pitchFamily="49" charset="0"/>
+              </a:rPr>
+              <a:t>(</a:t>
+            </a:r>
+            <a:r>
+              <a:rPr lang="en-GB" sz="1600" i="1" dirty="0" err="1">
+                <a:latin typeface="Courier" pitchFamily="49" charset="0"/>
+              </a:rPr>
+              <a:t>integer</a:t>
+            </a:r>
+            <a:r>
+              <a:rPr lang="en-GB" sz="1600" dirty="0" err="1">
+                <a:latin typeface="Courier" pitchFamily="49" charset="0"/>
+              </a:rPr>
+              <a:t>.str</a:t>
+            </a:r>
+            <a:r>
+              <a:rPr lang="en-GB" sz="1600" dirty="0">
+                <a:latin typeface="Courier" pitchFamily="49" charset="0"/>
+              </a:rPr>
+              <a:t>) }</a:t>
+            </a:r>
+            <a:endParaRPr lang="en-GB" dirty="0"/>
+          </a:p>
+        </p:txBody>
+      </p:sp>
+    </p:spTree>
+    <p:extLst>
+      <p:ext uri="{BB962C8B-B14F-4D97-AF65-F5344CB8AC3E}">
+        <p14:creationId xmlns:p14="http://schemas.microsoft.com/office/powerpoint/2010/main" val="3834245864"/>
+      </p:ext>
+    </p:extLst>
+  </p:cSld>
+  <p:clrMapOvr>
+    <a:masterClrMapping/>
+  </p:clrMapOvr>
+</p:sld>
+</file>
+
 <file path=ppt/slides/slide9.xml><?xml version="1.0" encoding="utf-8"?>
 <p:sld xmlns:a="http://schemas.openxmlformats.org/drawingml/2006/main" xmlns:r="http://schemas.openxmlformats.org/officeDocument/2006/relationships" xmlns:p="http://schemas.openxmlformats.org/presentationml/2006/main">
   <p:cSld>
@@ -11083,562 +11201,59 @@
         </p:nvSpPr>
         <p:spPr/>
         <p:txBody>
-          <a:bodyPr/>
+          <a:bodyPr>
+            <a:normAutofit/>
+          </a:bodyPr>
           <a:lstStyle/>
           <a:p>
+            <a:endParaRPr lang="en-GB" dirty="0"/>
+          </a:p>
+          <a:p>
             <a:r>
               <a:rPr lang="en-GB" dirty="0"/>
-              <a:t>How did we built it?</a:t>
+              <a:t>Advantages include</a:t>
             </a:r>
           </a:p>
           <a:p>
             <a:pPr lvl="1"/>
             <a:r>
+              <a:rPr lang="en-GB" i="1" dirty="0"/>
+              <a:t>Performance</a:t>
+            </a:r>
+            <a:r>
               <a:rPr lang="en-GB" dirty="0"/>
-              <a:t>Syntax-Driven Translation </a:t>
-            </a:r>
-            <a:r>
-              <a:rPr lang="en-GB" dirty="0" err="1"/>
-              <a:t>Schematas</a:t>
+              <a:t>: we have seen runtimes 4-10 times faster than previous engine execution in complex decision tests</a:t>
+            </a:r>
+          </a:p>
+          <a:p>
+            <a:pPr lvl="1"/>
+            <a:r>
+              <a:rPr lang="en-GB" i="1" dirty="0"/>
+              <a:t>Stability:</a:t>
             </a:r>
             <a:r>
               <a:rPr lang="en-GB" dirty="0"/>
-              <a:t> (SDTS)</a:t>
+              <a:t> given that we now control the code generation, we are able to resolve issues without relying on the vendor</a:t>
             </a:r>
           </a:p>
           <a:p>
             <a:pPr lvl="1"/>
             <a:r>
+              <a:rPr lang="en-GB" i="1" dirty="0"/>
+              <a:t>Functionality:</a:t>
+            </a:r>
+            <a:r>
               <a:rPr lang="en-GB" dirty="0"/>
-              <a:t>Based on Knuth’s attributed </a:t>
-            </a:r>
-            <a:r>
-              <a:rPr lang="en-GB" dirty="0" err="1"/>
-              <a:t>gramars</a:t>
-            </a:r>
+              <a:t> the fact that we control the code generation means that we are also able to enable more advanced functionality for DMN/Java models</a:t>
+            </a:r>
+          </a:p>
+          <a:p>
+            <a:pPr lvl="1"/>
             <a:endParaRPr lang="en-GB" dirty="0"/>
           </a:p>
-          <a:p>
-            <a:pPr lvl="2"/>
-            <a:r>
-              <a:rPr lang="en-GB" dirty="0"/>
-              <a:t>Synthesized attributes</a:t>
-            </a:r>
-          </a:p>
-          <a:p>
-            <a:pPr lvl="2"/>
-            <a:r>
-              <a:rPr lang="en-GB" dirty="0"/>
-              <a:t>Inherited Attributes</a:t>
-            </a:r>
-          </a:p>
-          <a:p>
-            <a:pPr marL="594360" lvl="2" indent="0">
-              <a:buNone/>
-            </a:pPr>
-            <a:endParaRPr lang="en-GB" dirty="0"/>
-          </a:p>
-          <a:p>
-            <a:pPr marL="594360" lvl="2" indent="0">
-              <a:buNone/>
-            </a:pPr>
-            <a:endParaRPr lang="en-GB" dirty="0"/>
-          </a:p>
-          <a:p>
-            <a:pPr marL="0" indent="0">
-              <a:buNone/>
-            </a:pPr>
-            <a:r>
-              <a:rPr lang="en-GB" sz="1600" b="1" dirty="0">
-                <a:latin typeface="Courier" pitchFamily="49" charset="0"/>
-              </a:rPr>
-              <a:t>Expr</a:t>
-            </a:r>
-            <a:r>
-              <a:rPr lang="en-GB" sz="1600" b="1" baseline="-25000" dirty="0">
-                <a:latin typeface="Courier" pitchFamily="49" charset="0"/>
-              </a:rPr>
-              <a:t>1</a:t>
-            </a:r>
-            <a:r>
-              <a:rPr lang="en-GB" sz="1600" dirty="0">
-                <a:latin typeface="Courier" pitchFamily="49" charset="0"/>
-              </a:rPr>
-              <a:t> → </a:t>
-            </a:r>
-            <a:r>
-              <a:rPr lang="en-GB" sz="1600" b="1" dirty="0">
-                <a:latin typeface="Courier" pitchFamily="49" charset="0"/>
-              </a:rPr>
-              <a:t>Expr</a:t>
-            </a:r>
-            <a:r>
-              <a:rPr lang="en-GB" sz="1600" b="1" baseline="-25000" dirty="0">
-                <a:latin typeface="Courier" pitchFamily="49" charset="0"/>
-              </a:rPr>
-              <a:t>2</a:t>
-            </a:r>
-            <a:r>
-              <a:rPr lang="en-GB" sz="1600" dirty="0">
-                <a:latin typeface="Courier" pitchFamily="49" charset="0"/>
-              </a:rPr>
-              <a:t> + </a:t>
-            </a:r>
-            <a:r>
-              <a:rPr lang="en-GB" sz="1600" b="1" dirty="0">
-                <a:latin typeface="Courier" pitchFamily="49" charset="0"/>
-              </a:rPr>
-              <a:t>Term	</a:t>
-            </a:r>
-            <a:r>
-              <a:rPr lang="en-GB" sz="1600" dirty="0">
-                <a:latin typeface="Courier" pitchFamily="49" charset="0"/>
-              </a:rPr>
-              <a:t>{ </a:t>
-            </a:r>
-            <a:r>
-              <a:rPr lang="en-GB" sz="1600" b="1" dirty="0">
-                <a:latin typeface="Courier" pitchFamily="49" charset="0"/>
-              </a:rPr>
-              <a:t>Expr</a:t>
-            </a:r>
-            <a:r>
-              <a:rPr lang="en-GB" sz="1600" b="1" baseline="-25000" dirty="0">
-                <a:latin typeface="Courier" pitchFamily="49" charset="0"/>
-              </a:rPr>
-              <a:t>1</a:t>
-            </a:r>
-            <a:r>
-              <a:rPr lang="en-GB" sz="1600" dirty="0">
-                <a:latin typeface="Courier" pitchFamily="49" charset="0"/>
-              </a:rPr>
-              <a:t>.value = </a:t>
-            </a:r>
-            <a:r>
-              <a:rPr lang="en-GB" sz="1600" b="1" dirty="0">
-                <a:latin typeface="Courier" pitchFamily="49" charset="0"/>
-              </a:rPr>
-              <a:t>Expr</a:t>
-            </a:r>
-            <a:r>
-              <a:rPr lang="en-GB" sz="1600" b="1" baseline="-25000" dirty="0">
-                <a:latin typeface="Courier" pitchFamily="49" charset="0"/>
-              </a:rPr>
-              <a:t>2</a:t>
-            </a:r>
-            <a:r>
-              <a:rPr lang="en-GB" sz="1600" dirty="0">
-                <a:latin typeface="Courier" pitchFamily="49" charset="0"/>
-              </a:rPr>
-              <a:t>.value + </a:t>
-            </a:r>
-            <a:r>
-              <a:rPr lang="en-GB" sz="1600" b="1" dirty="0" err="1">
-                <a:latin typeface="Courier" pitchFamily="49" charset="0"/>
-              </a:rPr>
-              <a:t>Term</a:t>
-            </a:r>
-            <a:r>
-              <a:rPr lang="en-GB" sz="1600" dirty="0" err="1">
-                <a:latin typeface="Courier" pitchFamily="49" charset="0"/>
-              </a:rPr>
-              <a:t>.value</a:t>
-            </a:r>
-            <a:r>
-              <a:rPr lang="en-GB" sz="1600" dirty="0">
-                <a:latin typeface="Courier" pitchFamily="49" charset="0"/>
-              </a:rPr>
-              <a:t> }</a:t>
-            </a:r>
-          </a:p>
-          <a:p>
-            <a:pPr marL="0" indent="0">
-              <a:buNone/>
-            </a:pPr>
-            <a:r>
-              <a:rPr lang="en-GB" sz="1600" b="1" dirty="0">
-                <a:latin typeface="Courier" pitchFamily="49" charset="0"/>
-              </a:rPr>
-              <a:t>Expr</a:t>
-            </a:r>
-            <a:r>
-              <a:rPr lang="en-GB" sz="1600" dirty="0">
-                <a:latin typeface="Courier" pitchFamily="49" charset="0"/>
-              </a:rPr>
-              <a:t> → </a:t>
-            </a:r>
-            <a:r>
-              <a:rPr lang="en-GB" sz="1600" b="1" dirty="0">
-                <a:latin typeface="Courier" pitchFamily="49" charset="0"/>
-              </a:rPr>
-              <a:t>Term</a:t>
-            </a:r>
-            <a:r>
-              <a:rPr lang="en-GB" sz="1600" dirty="0">
-                <a:latin typeface="Courier" pitchFamily="49" charset="0"/>
-              </a:rPr>
-              <a:t>		{ </a:t>
-            </a:r>
-            <a:r>
-              <a:rPr lang="en-GB" sz="1600" b="1" dirty="0" err="1">
-                <a:latin typeface="Courier" pitchFamily="49" charset="0"/>
-              </a:rPr>
-              <a:t>Expr</a:t>
-            </a:r>
-            <a:r>
-              <a:rPr lang="en-GB" sz="1600" dirty="0" err="1">
-                <a:latin typeface="Courier" pitchFamily="49" charset="0"/>
-              </a:rPr>
-              <a:t>.value</a:t>
-            </a:r>
-            <a:r>
-              <a:rPr lang="en-GB" sz="1600" dirty="0">
-                <a:latin typeface="Courier" pitchFamily="49" charset="0"/>
-              </a:rPr>
-              <a:t> = </a:t>
-            </a:r>
-            <a:r>
-              <a:rPr lang="en-GB" sz="1600" b="1" dirty="0" err="1">
-                <a:latin typeface="Courier" pitchFamily="49" charset="0"/>
-              </a:rPr>
-              <a:t>Term</a:t>
-            </a:r>
-            <a:r>
-              <a:rPr lang="en-GB" sz="1600" dirty="0" err="1">
-                <a:latin typeface="Courier" pitchFamily="49" charset="0"/>
-              </a:rPr>
-              <a:t>.value</a:t>
-            </a:r>
-            <a:r>
-              <a:rPr lang="en-GB" sz="1600" dirty="0">
-                <a:latin typeface="Courier" pitchFamily="49" charset="0"/>
-              </a:rPr>
-              <a:t> }</a:t>
-            </a:r>
-          </a:p>
-          <a:p>
-            <a:pPr marL="0" indent="0">
-              <a:buNone/>
-            </a:pPr>
-            <a:r>
-              <a:rPr lang="en-GB" sz="1600" b="1" dirty="0">
-                <a:latin typeface="Courier" pitchFamily="49" charset="0"/>
-              </a:rPr>
-              <a:t>Term</a:t>
-            </a:r>
-            <a:r>
-              <a:rPr lang="en-GB" sz="1600" b="1" baseline="-25000" dirty="0">
-                <a:latin typeface="Courier" pitchFamily="49" charset="0"/>
-              </a:rPr>
-              <a:t>1</a:t>
-            </a:r>
-            <a:r>
-              <a:rPr lang="en-GB" sz="1600" dirty="0">
-                <a:latin typeface="Courier" pitchFamily="49" charset="0"/>
-              </a:rPr>
-              <a:t> → </a:t>
-            </a:r>
-            <a:r>
-              <a:rPr lang="en-GB" sz="1600" b="1" dirty="0">
-                <a:latin typeface="Courier" pitchFamily="49" charset="0"/>
-              </a:rPr>
-              <a:t>Term</a:t>
-            </a:r>
-            <a:r>
-              <a:rPr lang="en-GB" sz="1600" b="1" baseline="-25000" dirty="0">
-                <a:latin typeface="Courier" pitchFamily="49" charset="0"/>
-              </a:rPr>
-              <a:t>2</a:t>
-            </a:r>
-            <a:r>
-              <a:rPr lang="en-GB" sz="1600" dirty="0">
-                <a:latin typeface="Courier" pitchFamily="49" charset="0"/>
-              </a:rPr>
-              <a:t> * </a:t>
-            </a:r>
-            <a:r>
-              <a:rPr lang="en-GB" sz="1600" b="1" dirty="0">
-                <a:latin typeface="Courier" pitchFamily="49" charset="0"/>
-              </a:rPr>
-              <a:t>Factor	</a:t>
-            </a:r>
-            <a:r>
-              <a:rPr lang="en-GB" sz="1600" dirty="0">
-                <a:latin typeface="Courier" pitchFamily="49" charset="0"/>
-              </a:rPr>
-              <a:t>{ </a:t>
-            </a:r>
-            <a:r>
-              <a:rPr lang="en-GB" sz="1600" b="1" dirty="0">
-                <a:latin typeface="Courier" pitchFamily="49" charset="0"/>
-              </a:rPr>
-              <a:t>Term</a:t>
-            </a:r>
-            <a:r>
-              <a:rPr lang="en-GB" sz="1600" b="1" baseline="-25000" dirty="0">
-                <a:latin typeface="Courier" pitchFamily="49" charset="0"/>
-              </a:rPr>
-              <a:t>1</a:t>
-            </a:r>
-            <a:r>
-              <a:rPr lang="en-GB" sz="1600" dirty="0">
-                <a:latin typeface="Courier" pitchFamily="49" charset="0"/>
-              </a:rPr>
-              <a:t>.value = </a:t>
-            </a:r>
-            <a:r>
-              <a:rPr lang="en-GB" sz="1600" b="1" dirty="0">
-                <a:latin typeface="Courier" pitchFamily="49" charset="0"/>
-              </a:rPr>
-              <a:t>Term</a:t>
-            </a:r>
-            <a:r>
-              <a:rPr lang="en-GB" sz="1600" b="1" baseline="-25000" dirty="0">
-                <a:latin typeface="Courier" pitchFamily="49" charset="0"/>
-              </a:rPr>
-              <a:t>2</a:t>
-            </a:r>
-            <a:r>
-              <a:rPr lang="en-GB" sz="1600" dirty="0">
-                <a:latin typeface="Courier" pitchFamily="49" charset="0"/>
-              </a:rPr>
-              <a:t>.value * </a:t>
-            </a:r>
-            <a:r>
-              <a:rPr lang="en-GB" sz="1600" b="1" dirty="0" err="1">
-                <a:latin typeface="Courier" pitchFamily="49" charset="0"/>
-              </a:rPr>
-              <a:t>Factor</a:t>
-            </a:r>
-            <a:r>
-              <a:rPr lang="en-GB" sz="1600" dirty="0" err="1">
-                <a:latin typeface="Courier" pitchFamily="49" charset="0"/>
-              </a:rPr>
-              <a:t>.value</a:t>
-            </a:r>
-            <a:r>
-              <a:rPr lang="en-GB" sz="1600" dirty="0">
-                <a:latin typeface="Courier" pitchFamily="49" charset="0"/>
-              </a:rPr>
-              <a:t> }</a:t>
-            </a:r>
-          </a:p>
-          <a:p>
-            <a:pPr marL="0" indent="0">
-              <a:buNone/>
-            </a:pPr>
-            <a:r>
-              <a:rPr lang="en-GB" sz="1600" b="1" dirty="0">
-                <a:latin typeface="Courier" pitchFamily="49" charset="0"/>
-              </a:rPr>
-              <a:t>Term</a:t>
-            </a:r>
-            <a:r>
-              <a:rPr lang="en-GB" sz="1600" dirty="0">
-                <a:latin typeface="Courier" pitchFamily="49" charset="0"/>
-              </a:rPr>
-              <a:t> → </a:t>
-            </a:r>
-            <a:r>
-              <a:rPr lang="en-GB" sz="1600" b="1" dirty="0">
-                <a:latin typeface="Courier" pitchFamily="49" charset="0"/>
-              </a:rPr>
-              <a:t>Factor</a:t>
-            </a:r>
-            <a:r>
-              <a:rPr lang="en-GB" sz="1600" dirty="0">
-                <a:latin typeface="Courier" pitchFamily="49" charset="0"/>
-              </a:rPr>
-              <a:t>		{ </a:t>
-            </a:r>
-            <a:r>
-              <a:rPr lang="en-GB" sz="1600" b="1" dirty="0" err="1">
-                <a:latin typeface="Courier" pitchFamily="49" charset="0"/>
-              </a:rPr>
-              <a:t>Term</a:t>
-            </a:r>
-            <a:r>
-              <a:rPr lang="en-GB" sz="1600" dirty="0" err="1">
-                <a:latin typeface="Courier" pitchFamily="49" charset="0"/>
-              </a:rPr>
-              <a:t>.value</a:t>
-            </a:r>
-            <a:r>
-              <a:rPr lang="en-GB" sz="1600" dirty="0">
-                <a:latin typeface="Courier" pitchFamily="49" charset="0"/>
-              </a:rPr>
-              <a:t> = </a:t>
-            </a:r>
-            <a:r>
-              <a:rPr lang="en-GB" sz="1600" b="1" dirty="0" err="1">
-                <a:latin typeface="Courier" pitchFamily="49" charset="0"/>
-              </a:rPr>
-              <a:t>Factor</a:t>
-            </a:r>
-            <a:r>
-              <a:rPr lang="en-GB" sz="1600" dirty="0" err="1">
-                <a:latin typeface="Courier" pitchFamily="49" charset="0"/>
-              </a:rPr>
-              <a:t>.value</a:t>
-            </a:r>
-            <a:r>
-              <a:rPr lang="en-GB" sz="1600" dirty="0">
-                <a:latin typeface="Courier" pitchFamily="49" charset="0"/>
-              </a:rPr>
-              <a:t> } </a:t>
-            </a:r>
-          </a:p>
-          <a:p>
-            <a:pPr marL="0" indent="0">
-              <a:buNone/>
-            </a:pPr>
-            <a:r>
-              <a:rPr lang="en-GB" sz="1600" b="1" dirty="0">
-                <a:latin typeface="Courier" pitchFamily="49" charset="0"/>
-              </a:rPr>
-              <a:t>Factor</a:t>
-            </a:r>
-            <a:r>
-              <a:rPr lang="en-GB" sz="1600" dirty="0">
-                <a:latin typeface="Courier" pitchFamily="49" charset="0"/>
-              </a:rPr>
-              <a:t> → "(" </a:t>
-            </a:r>
-            <a:r>
-              <a:rPr lang="en-GB" sz="1600" b="1" dirty="0">
-                <a:latin typeface="Courier" pitchFamily="49" charset="0"/>
-              </a:rPr>
-              <a:t>Expr</a:t>
-            </a:r>
-            <a:r>
-              <a:rPr lang="en-GB" sz="1600" dirty="0">
-                <a:latin typeface="Courier" pitchFamily="49" charset="0"/>
-              </a:rPr>
-              <a:t> ")	{ </a:t>
-            </a:r>
-            <a:r>
-              <a:rPr lang="en-GB" sz="1600" b="1" dirty="0" err="1">
-                <a:latin typeface="Courier" pitchFamily="49" charset="0"/>
-              </a:rPr>
-              <a:t>Factor</a:t>
-            </a:r>
-            <a:r>
-              <a:rPr lang="en-GB" sz="1600" dirty="0" err="1">
-                <a:latin typeface="Courier" pitchFamily="49" charset="0"/>
-              </a:rPr>
-              <a:t>.value</a:t>
-            </a:r>
-            <a:r>
-              <a:rPr lang="en-GB" sz="1600" dirty="0">
-                <a:latin typeface="Courier" pitchFamily="49" charset="0"/>
-              </a:rPr>
-              <a:t> = </a:t>
-            </a:r>
-            <a:r>
-              <a:rPr lang="en-GB" sz="1600" b="1" dirty="0" err="1">
-                <a:latin typeface="Courier" pitchFamily="49" charset="0"/>
-              </a:rPr>
-              <a:t>Expr</a:t>
-            </a:r>
-            <a:r>
-              <a:rPr lang="en-GB" sz="1600" dirty="0" err="1">
-                <a:latin typeface="Courier" pitchFamily="49" charset="0"/>
-              </a:rPr>
-              <a:t>.value</a:t>
-            </a:r>
-            <a:r>
-              <a:rPr lang="en-GB" sz="1600" dirty="0">
-                <a:latin typeface="Courier" pitchFamily="49" charset="0"/>
-              </a:rPr>
-              <a:t> } </a:t>
-            </a:r>
-          </a:p>
-          <a:p>
-            <a:pPr marL="0" indent="0">
-              <a:buNone/>
-            </a:pPr>
-            <a:r>
-              <a:rPr lang="en-GB" sz="1600" b="1" dirty="0">
-                <a:latin typeface="Courier" pitchFamily="49" charset="0"/>
-              </a:rPr>
-              <a:t>Factor</a:t>
-            </a:r>
-            <a:r>
-              <a:rPr lang="en-GB" sz="1600" dirty="0">
-                <a:latin typeface="Courier" pitchFamily="49" charset="0"/>
-              </a:rPr>
-              <a:t> → </a:t>
-            </a:r>
-            <a:r>
-              <a:rPr lang="en-GB" sz="1600" i="1" dirty="0">
-                <a:latin typeface="Courier" pitchFamily="49" charset="0"/>
-              </a:rPr>
-              <a:t>integer</a:t>
-            </a:r>
-            <a:r>
-              <a:rPr lang="en-GB" sz="1600" dirty="0">
-                <a:latin typeface="Courier" pitchFamily="49" charset="0"/>
-              </a:rPr>
-              <a:t> 	{ </a:t>
-            </a:r>
-            <a:r>
-              <a:rPr lang="en-GB" sz="1600" b="1" dirty="0" err="1">
-                <a:latin typeface="Courier" pitchFamily="49" charset="0"/>
-              </a:rPr>
-              <a:t>Factor</a:t>
-            </a:r>
-            <a:r>
-              <a:rPr lang="en-GB" sz="1600" dirty="0" err="1">
-                <a:latin typeface="Courier" pitchFamily="49" charset="0"/>
-              </a:rPr>
-              <a:t>.value</a:t>
-            </a:r>
-            <a:r>
-              <a:rPr lang="en-GB" sz="1600" dirty="0">
-                <a:latin typeface="Courier" pitchFamily="49" charset="0"/>
-              </a:rPr>
-              <a:t> = </a:t>
-            </a:r>
-            <a:r>
-              <a:rPr lang="en-GB" sz="1600" dirty="0" err="1">
-                <a:latin typeface="Courier" pitchFamily="49" charset="0"/>
-              </a:rPr>
-              <a:t>strToInt</a:t>
-            </a:r>
-            <a:r>
-              <a:rPr lang="en-GB" sz="1600" dirty="0">
-                <a:latin typeface="Courier" pitchFamily="49" charset="0"/>
-              </a:rPr>
-              <a:t>(</a:t>
-            </a:r>
-            <a:r>
-              <a:rPr lang="en-GB" sz="1600" i="1" dirty="0" err="1">
-                <a:latin typeface="Courier" pitchFamily="49" charset="0"/>
-              </a:rPr>
-              <a:t>integer</a:t>
-            </a:r>
-            <a:r>
-              <a:rPr lang="en-GB" sz="1600" dirty="0" err="1">
-                <a:latin typeface="Courier" pitchFamily="49" charset="0"/>
-              </a:rPr>
-              <a:t>.str</a:t>
-            </a:r>
-            <a:r>
-              <a:rPr lang="en-GB" sz="1600" dirty="0">
-                <a:latin typeface="Courier" pitchFamily="49" charset="0"/>
-              </a:rPr>
-              <a:t>) }</a:t>
-            </a:r>
-            <a:endParaRPr lang="en-GB" dirty="0"/>
-          </a:p>
         </p:txBody>
       </p:sp>
     </p:spTree>
-    <p:extLst>
-      <p:ext uri="{BB962C8B-B14F-4D97-AF65-F5344CB8AC3E}">
-        <p14:creationId xmlns:p14="http://schemas.microsoft.com/office/powerpoint/2010/main" val="3834245864"/>
-      </p:ext>
-    </p:extLst>
   </p:cSld>
   <p:clrMapOvr>
     <a:masterClrMapping/>

</xml_diff>